<commit_message>
Add CSV export for training and validation vectors
</commit_message>
<xml_diff>
--- a/defender/DefenderSlides.pptx
+++ b/defender/DefenderSlides.pptx
@@ -7,8 +7,8 @@
   <p:sldIdLst>
     <p:sldId id="256" r:id="rId2"/>
     <p:sldId id="257" r:id="rId3"/>
-    <p:sldId id="262" r:id="rId4"/>
-    <p:sldId id="263" r:id="rId5"/>
+    <p:sldId id="263" r:id="rId4"/>
+    <p:sldId id="262" r:id="rId5"/>
     <p:sldId id="258" r:id="rId6"/>
     <p:sldId id="266" r:id="rId7"/>
     <p:sldId id="261" r:id="rId8"/>
@@ -292,7 +292,7 @@
           <a:p>
             <a:fld id="{A5CE7FD4-0403-4900-89EA-BB2B497AEF90}" type="datetimeFigureOut">
               <a:rPr lang="en-US" smtClean="0"/>
-              <a:t>4/23/2023</a:t>
+              <a:t>4/25/2023</a:t>
             </a:fld>
             <a:endParaRPr lang="en-US"/>
           </a:p>
@@ -490,7 +490,7 @@
           <a:p>
             <a:fld id="{A5CE7FD4-0403-4900-89EA-BB2B497AEF90}" type="datetimeFigureOut">
               <a:rPr lang="en-US" smtClean="0"/>
-              <a:t>4/23/2023</a:t>
+              <a:t>4/25/2023</a:t>
             </a:fld>
             <a:endParaRPr lang="en-US"/>
           </a:p>
@@ -698,7 +698,7 @@
           <a:p>
             <a:fld id="{A5CE7FD4-0403-4900-89EA-BB2B497AEF90}" type="datetimeFigureOut">
               <a:rPr lang="en-US" smtClean="0"/>
-              <a:t>4/23/2023</a:t>
+              <a:t>4/25/2023</a:t>
             </a:fld>
             <a:endParaRPr lang="en-US"/>
           </a:p>
@@ -896,7 +896,7 @@
           <a:p>
             <a:fld id="{A5CE7FD4-0403-4900-89EA-BB2B497AEF90}" type="datetimeFigureOut">
               <a:rPr lang="en-US" smtClean="0"/>
-              <a:t>4/23/2023</a:t>
+              <a:t>4/25/2023</a:t>
             </a:fld>
             <a:endParaRPr lang="en-US"/>
           </a:p>
@@ -1171,7 +1171,7 @@
           <a:p>
             <a:fld id="{A5CE7FD4-0403-4900-89EA-BB2B497AEF90}" type="datetimeFigureOut">
               <a:rPr lang="en-US" smtClean="0"/>
-              <a:t>4/23/2023</a:t>
+              <a:t>4/25/2023</a:t>
             </a:fld>
             <a:endParaRPr lang="en-US"/>
           </a:p>
@@ -1436,7 +1436,7 @@
           <a:p>
             <a:fld id="{A5CE7FD4-0403-4900-89EA-BB2B497AEF90}" type="datetimeFigureOut">
               <a:rPr lang="en-US" smtClean="0"/>
-              <a:t>4/23/2023</a:t>
+              <a:t>4/25/2023</a:t>
             </a:fld>
             <a:endParaRPr lang="en-US"/>
           </a:p>
@@ -1848,7 +1848,7 @@
           <a:p>
             <a:fld id="{A5CE7FD4-0403-4900-89EA-BB2B497AEF90}" type="datetimeFigureOut">
               <a:rPr lang="en-US" smtClean="0"/>
-              <a:t>4/23/2023</a:t>
+              <a:t>4/25/2023</a:t>
             </a:fld>
             <a:endParaRPr lang="en-US"/>
           </a:p>
@@ -1989,7 +1989,7 @@
           <a:p>
             <a:fld id="{A5CE7FD4-0403-4900-89EA-BB2B497AEF90}" type="datetimeFigureOut">
               <a:rPr lang="en-US" smtClean="0"/>
-              <a:t>4/23/2023</a:t>
+              <a:t>4/25/2023</a:t>
             </a:fld>
             <a:endParaRPr lang="en-US"/>
           </a:p>
@@ -2102,7 +2102,7 @@
           <a:p>
             <a:fld id="{A5CE7FD4-0403-4900-89EA-BB2B497AEF90}" type="datetimeFigureOut">
               <a:rPr lang="en-US" smtClean="0"/>
-              <a:t>4/23/2023</a:t>
+              <a:t>4/25/2023</a:t>
             </a:fld>
             <a:endParaRPr lang="en-US"/>
           </a:p>
@@ -2413,7 +2413,7 @@
           <a:p>
             <a:fld id="{A5CE7FD4-0403-4900-89EA-BB2B497AEF90}" type="datetimeFigureOut">
               <a:rPr lang="en-US" smtClean="0"/>
-              <a:t>4/23/2023</a:t>
+              <a:t>4/25/2023</a:t>
             </a:fld>
             <a:endParaRPr lang="en-US"/>
           </a:p>
@@ -2701,7 +2701,7 @@
           <a:p>
             <a:fld id="{A5CE7FD4-0403-4900-89EA-BB2B497AEF90}" type="datetimeFigureOut">
               <a:rPr lang="en-US" smtClean="0"/>
-              <a:t>4/23/2023</a:t>
+              <a:t>4/25/2023</a:t>
             </a:fld>
             <a:endParaRPr lang="en-US"/>
           </a:p>
@@ -2942,7 +2942,7 @@
           <a:p>
             <a:fld id="{A5CE7FD4-0403-4900-89EA-BB2B497AEF90}" type="datetimeFigureOut">
               <a:rPr lang="en-US" smtClean="0"/>
-              <a:t>4/23/2023</a:t>
+              <a:t>4/25/2023</a:t>
             </a:fld>
             <a:endParaRPr lang="en-US"/>
           </a:p>
@@ -3386,7 +3386,7 @@
             </a:r>
             <a:r>
               <a:rPr lang="en-US" altLang="zh-CN" dirty="0"/>
-              <a:t>Defend</a:t>
+              <a:t>Defense</a:t>
             </a:r>
             <a:endParaRPr lang="en-US" dirty="0"/>
           </a:p>
@@ -4934,7 +4934,7 @@
           <a:p>
             <a:r>
               <a:rPr lang="en-US" dirty="0"/>
-              <a:t>Motivation</a:t>
+              <a:t>Submitted Model</a:t>
             </a:r>
           </a:p>
         </p:txBody>
@@ -4962,28 +4962,13 @@
           <a:p>
             <a:r>
               <a:rPr lang="en-US" dirty="0"/>
-              <a:t>Comparing all papers covering in this class, Dr. </a:t>
-            </a:r>
-            <a:r>
-              <a:rPr lang="en-US" dirty="0" err="1"/>
-              <a:t>Botacin’s</a:t>
-            </a:r>
-            <a:r>
-              <a:rPr lang="en-US" dirty="0"/>
-              <a:t> method proved to yield the highest evasion rates.</a:t>
-            </a:r>
-          </a:p>
-          <a:p>
-            <a:pPr marL="0" indent="0">
-              <a:buNone/>
-            </a:pPr>
+              <a:t>Random Forest (</a:t>
+            </a:r>
+            <a:r>
+              <a:rPr lang="en-US"/>
+              <a:t>1000 estimators)</a:t>
+            </a:r>
             <a:endParaRPr lang="en-US" dirty="0"/>
-          </a:p>
-          <a:p>
-            <a:r>
-              <a:rPr lang="en-US" dirty="0"/>
-              <a:t>We decided to take the existing example on Github and augment it with improvements.</a:t>
-            </a:r>
           </a:p>
         </p:txBody>
       </p:sp>
@@ -6246,7 +6231,7 @@
           <p:cNvPr id="2" name="Title 1">
             <a:extLst>
               <a:ext uri="{FF2B5EF4-FFF2-40B4-BE49-F238E27FC236}">
-                <a16:creationId xmlns:a16="http://schemas.microsoft.com/office/drawing/2014/main" id="{F0CF6617-A08A-C0D6-F1DE-192CBAA5BE64}"/>
+                <a16:creationId xmlns:a16="http://schemas.microsoft.com/office/drawing/2014/main" id="{4FB198E3-1EDE-0E6D-7A4D-CE66E43E21FD}"/>
               </a:ext>
             </a:extLst>
           </p:cNvPr>
@@ -6264,7 +6249,7 @@
           <a:p>
             <a:r>
               <a:rPr lang="en-US" dirty="0"/>
-              <a:t>Baseline Attack</a:t>
+              <a:t>Dataset</a:t>
             </a:r>
           </a:p>
         </p:txBody>
@@ -6274,7 +6259,7 @@
           <p:cNvPr id="3" name="Content Placeholder 2">
             <a:extLst>
               <a:ext uri="{FF2B5EF4-FFF2-40B4-BE49-F238E27FC236}">
-                <a16:creationId xmlns:a16="http://schemas.microsoft.com/office/drawing/2014/main" id="{BB3EDD30-3F33-08E6-18FC-603451BAE124}"/>
+                <a16:creationId xmlns:a16="http://schemas.microsoft.com/office/drawing/2014/main" id="{9D118AC6-6D85-C3C2-E653-2FC1561C7EFE}"/>
               </a:ext>
             </a:extLst>
           </p:cNvPr>
@@ -6287,120 +6272,17 @@
         </p:nvSpPr>
         <p:spPr/>
         <p:txBody>
-          <a:bodyPr>
-            <a:normAutofit lnSpcReduction="10000"/>
-          </a:bodyPr>
-          <a:lstStyle/>
-          <a:p>
-            <a:r>
-              <a:rPr lang="en-US" dirty="0"/>
-              <a:t>Combined Dr. </a:t>
-            </a:r>
-            <a:r>
-              <a:rPr lang="en-US" dirty="0" err="1"/>
-              <a:t>Botacin’s</a:t>
-            </a:r>
-            <a:r>
-              <a:rPr lang="en-US" dirty="0"/>
-              <a:t> filesystem.exe and inmemory.dll droppers into a single dropper that:</a:t>
-            </a:r>
-          </a:p>
-          <a:p>
-            <a:pPr marL="914400" lvl="1" indent="-457200">
-              <a:buFont typeface="+mj-lt"/>
-              <a:buAutoNum type="arabicPeriod"/>
-            </a:pPr>
-            <a:r>
-              <a:rPr lang="en-US" dirty="0"/>
-              <a:t>Compiled into an executable</a:t>
-            </a:r>
-          </a:p>
-          <a:p>
-            <a:pPr marL="914400" lvl="1" indent="-457200">
-              <a:buFont typeface="+mj-lt"/>
-              <a:buAutoNum type="arabicPeriod"/>
-            </a:pPr>
-            <a:r>
-              <a:rPr lang="en-US" dirty="0"/>
-              <a:t>Contained a single resource</a:t>
-            </a:r>
-          </a:p>
-          <a:p>
-            <a:pPr marL="914400" lvl="1" indent="-457200">
-              <a:buFont typeface="+mj-lt"/>
-              <a:buAutoNum type="arabicPeriod"/>
-            </a:pPr>
-            <a:r>
-              <a:rPr lang="en-US" dirty="0"/>
-              <a:t>XOR decrypted the resource</a:t>
-            </a:r>
-          </a:p>
-          <a:p>
-            <a:pPr marL="914400" lvl="1" indent="-457200">
-              <a:buFont typeface="+mj-lt"/>
-              <a:buAutoNum type="arabicPeriod"/>
-            </a:pPr>
-            <a:r>
-              <a:rPr lang="en-US" dirty="0"/>
-              <a:t>Base64 decoded the resource</a:t>
-            </a:r>
-          </a:p>
-          <a:p>
-            <a:pPr marL="914400" lvl="1" indent="-457200">
-              <a:buFont typeface="+mj-lt"/>
-              <a:buAutoNum type="arabicPeriod"/>
-            </a:pPr>
-            <a:r>
-              <a:rPr lang="en-US" dirty="0"/>
-              <a:t>Wrote the resource to file</a:t>
-            </a:r>
-          </a:p>
-          <a:p>
-            <a:pPr marL="914400" lvl="1" indent="-457200">
-              <a:buFont typeface="+mj-lt"/>
-              <a:buAutoNum type="arabicPeriod"/>
-            </a:pPr>
-            <a:r>
-              <a:rPr lang="en-US" dirty="0"/>
-              <a:t>Launched the resource</a:t>
-            </a:r>
-          </a:p>
-          <a:p>
-            <a:pPr marL="914400" lvl="1" indent="-457200">
-              <a:buFont typeface="+mj-lt"/>
-              <a:buAutoNum type="arabicPeriod"/>
-            </a:pPr>
-            <a:r>
-              <a:rPr lang="en-US" dirty="0"/>
-              <a:t>Dynamically loaded 90% of APIs</a:t>
-            </a:r>
-          </a:p>
-          <a:p>
-            <a:pPr marL="914400" lvl="1" indent="-457200">
-              <a:buFont typeface="+mj-lt"/>
-              <a:buAutoNum type="arabicPeriod"/>
-            </a:pPr>
-            <a:r>
-              <a:rPr lang="en-US" dirty="0"/>
-              <a:t>Encoded strings as int arrays</a:t>
-            </a:r>
-          </a:p>
-          <a:p>
-            <a:pPr marL="914400" lvl="1" indent="-457200">
-              <a:buFont typeface="+mj-lt"/>
-              <a:buAutoNum type="arabicPeriod"/>
-            </a:pPr>
-            <a:r>
-              <a:rPr lang="en-US" dirty="0"/>
-              <a:t>Mimicked the NTDLL.dll</a:t>
-            </a:r>
+          <a:bodyPr/>
+          <a:lstStyle/>
+          <a:p>
+            <a:endParaRPr lang="en-US" dirty="0"/>
           </a:p>
         </p:txBody>
       </p:sp>
     </p:spTree>
     <p:extLst>
       <p:ext uri="{BB962C8B-B14F-4D97-AF65-F5344CB8AC3E}">
-        <p14:creationId xmlns:p14="http://schemas.microsoft.com/office/powerpoint/2010/main" val="2985131579"/>
+        <p14:creationId xmlns:p14="http://schemas.microsoft.com/office/powerpoint/2010/main" val="1150152782"/>
       </p:ext>
     </p:extLst>
   </p:cSld>
@@ -7066,7 +6948,7 @@
           <p:cNvPr id="2" name="Title 1">
             <a:extLst>
               <a:ext uri="{FF2B5EF4-FFF2-40B4-BE49-F238E27FC236}">
-                <a16:creationId xmlns:a16="http://schemas.microsoft.com/office/drawing/2014/main" id="{4FB198E3-1EDE-0E6D-7A4D-CE66E43E21FD}"/>
+                <a16:creationId xmlns:a16="http://schemas.microsoft.com/office/drawing/2014/main" id="{F0CF6617-A08A-C0D6-F1DE-192CBAA5BE64}"/>
               </a:ext>
             </a:extLst>
           </p:cNvPr>
@@ -7084,7 +6966,7 @@
           <a:p>
             <a:r>
               <a:rPr lang="en-US" dirty="0"/>
-              <a:t>Baseline Attack Visualization</a:t>
+              <a:t>Feature Extraction</a:t>
             </a:r>
           </a:p>
         </p:txBody>
@@ -7094,7 +6976,7 @@
           <p:cNvPr id="3" name="Content Placeholder 2">
             <a:extLst>
               <a:ext uri="{FF2B5EF4-FFF2-40B4-BE49-F238E27FC236}">
-                <a16:creationId xmlns:a16="http://schemas.microsoft.com/office/drawing/2014/main" id="{9D118AC6-6D85-C3C2-E653-2FC1561C7EFE}"/>
+                <a16:creationId xmlns:a16="http://schemas.microsoft.com/office/drawing/2014/main" id="{BB3EDD30-3F33-08E6-18FC-603451BAE124}"/>
               </a:ext>
             </a:extLst>
           </p:cNvPr>
@@ -7107,17 +6989,49 @@
         </p:nvSpPr>
         <p:spPr/>
         <p:txBody>
-          <a:bodyPr/>
-          <a:lstStyle/>
-          <a:p>
-            <a:endParaRPr lang="en-US"/>
+          <a:bodyPr>
+            <a:normAutofit/>
+          </a:bodyPr>
+          <a:lstStyle/>
+          <a:p>
+            <a:pPr marL="0" indent="0">
+              <a:buNone/>
+            </a:pPr>
+            <a:r>
+              <a:rPr lang="en-US" dirty="0"/>
+              <a:t>414 features in total extracted</a:t>
+            </a:r>
+          </a:p>
+          <a:p>
+            <a:r>
+              <a:rPr lang="en-US" dirty="0"/>
+              <a:t>14 header features </a:t>
+            </a:r>
+          </a:p>
+          <a:p>
+            <a:r>
+              <a:rPr lang="en-US" dirty="0"/>
+              <a:t>200 bi-gram byte features </a:t>
+            </a:r>
+          </a:p>
+          <a:p>
+            <a:r>
+              <a:rPr lang="en-US" dirty="0"/>
+              <a:t>100 bi-gram opcode features </a:t>
+            </a:r>
+          </a:p>
+          <a:p>
+            <a:r>
+              <a:rPr lang="en-US" dirty="0"/>
+              <a:t>100 tri-gram opcode features</a:t>
+            </a:r>
           </a:p>
         </p:txBody>
       </p:sp>
     </p:spTree>
     <p:extLst>
       <p:ext uri="{BB962C8B-B14F-4D97-AF65-F5344CB8AC3E}">
-        <p14:creationId xmlns:p14="http://schemas.microsoft.com/office/powerpoint/2010/main" val="1150152782"/>
+        <p14:creationId xmlns:p14="http://schemas.microsoft.com/office/powerpoint/2010/main" val="2985131579"/>
       </p:ext>
     </p:extLst>
   </p:cSld>

</xml_diff>